<commit_message>
Arrumada a fonte da letra da apresentação
</commit_message>
<xml_diff>
--- a/CorrenteSolidaria.ppt.pptx
+++ b/CorrenteSolidaria.ppt.pptx
@@ -6150,25 +6150,40 @@
           <a:lstStyle/>
           <a:p>
             <a:r>
-              <a:rPr lang="pt-BR" dirty="0"/>
+              <a:rPr lang="pt-BR" dirty="0">
+                <a:latin typeface="Times New Roman" panose="02020603050405020304" pitchFamily="18" charset="0"/>
+                <a:cs typeface="Times New Roman" panose="02020603050405020304" pitchFamily="18" charset="0"/>
+              </a:rPr>
               <a:t>Pessoas que perderam integral ou parcialmente suas posses por causa de desastres, necessitando de auxílio material.</a:t>
             </a:r>
           </a:p>
           <a:p>
-            <a:endParaRPr lang="pt-BR" dirty="0"/>
-          </a:p>
-          <a:p>
-            <a:r>
-              <a:rPr lang="pt-BR" dirty="0"/>
+            <a:endParaRPr lang="pt-BR" dirty="0">
+              <a:latin typeface="Times New Roman" panose="02020603050405020304" pitchFamily="18" charset="0"/>
+              <a:cs typeface="Times New Roman" panose="02020603050405020304" pitchFamily="18" charset="0"/>
+            </a:endParaRPr>
+          </a:p>
+          <a:p>
+            <a:r>
+              <a:rPr lang="pt-BR" dirty="0">
+                <a:latin typeface="Times New Roman" panose="02020603050405020304" pitchFamily="18" charset="0"/>
+                <a:cs typeface="Times New Roman" panose="02020603050405020304" pitchFamily="18" charset="0"/>
+              </a:rPr>
               <a:t>Organizações/pessoas que se dizem “benevolentes” se aproveitando da falta de monitoramento para extravio de doações.</a:t>
             </a:r>
           </a:p>
           <a:p>
-            <a:endParaRPr lang="pt-BR" dirty="0"/>
-          </a:p>
-          <a:p>
-            <a:r>
-              <a:rPr lang="pt-BR" dirty="0"/>
+            <a:endParaRPr lang="pt-BR" dirty="0">
+              <a:latin typeface="Times New Roman" panose="02020603050405020304" pitchFamily="18" charset="0"/>
+              <a:cs typeface="Times New Roman" panose="02020603050405020304" pitchFamily="18" charset="0"/>
+            </a:endParaRPr>
+          </a:p>
+          <a:p>
+            <a:r>
+              <a:rPr lang="pt-BR" dirty="0">
+                <a:latin typeface="Times New Roman" panose="02020603050405020304" pitchFamily="18" charset="0"/>
+                <a:cs typeface="Times New Roman" panose="02020603050405020304" pitchFamily="18" charset="0"/>
+              </a:rPr>
               <a:t>Falta de incentivo/auxilio na hora de doar.</a:t>
             </a:r>
           </a:p>

</xml_diff>